<commit_message>
modify wordpress security and add 3 new file
</commit_message>
<xml_diff>
--- a/5. Wordpress Security.pptx
+++ b/5. Wordpress Security.pptx
@@ -20,6 +20,11 @@
     <p:sldId id="259" r:id="rId14"/>
     <p:sldId id="260" r:id="rId15"/>
     <p:sldId id="263" r:id="rId16"/>
+    <p:sldId id="272" r:id="rId17"/>
+    <p:sldId id="273" r:id="rId18"/>
+    <p:sldId id="274" r:id="rId19"/>
+    <p:sldId id="275" r:id="rId20"/>
+    <p:sldId id="276" r:id="rId21"/>
   </p:sldIdLst>
   <p:sldSz cx="12192000" cy="6858000"/>
   <p:notesSz cx="6858000" cy="9144000"/>
@@ -322,7 +327,7 @@
                 <a:tabLst/>
                 <a:defRPr/>
               </a:pPr>
-              <a:t>5/28/2018</a:t>
+              <a:t>5/29/2018</a:t>
             </a:fld>
             <a:endParaRPr kumimoji="0" lang="en-US" sz="1200" b="0" i="0" u="none" strike="noStrike" kern="1200" cap="none" spc="0" normalizeH="0" baseline="0" noProof="0">
               <a:ln>
@@ -680,7 +685,7 @@
                 <a:tabLst/>
                 <a:defRPr/>
               </a:pPr>
-              <a:t>5/28/2018</a:t>
+              <a:t>5/29/2018</a:t>
             </a:fld>
             <a:endParaRPr kumimoji="0" lang="en-US" sz="1200" b="0" i="0" u="none" strike="noStrike" kern="1200" cap="none" spc="0" normalizeH="0" baseline="0" noProof="0">
               <a:ln>
@@ -1048,7 +1053,7 @@
                 <a:tabLst/>
                 <a:defRPr/>
               </a:pPr>
-              <a:t>5/28/2018</a:t>
+              <a:t>5/29/2018</a:t>
             </a:fld>
             <a:endParaRPr kumimoji="0" lang="en-US" sz="1200" b="0" i="0" u="none" strike="noStrike" kern="1200" cap="none" spc="0" normalizeH="0" baseline="0" noProof="0">
               <a:ln>
@@ -1406,7 +1411,7 @@
                 <a:tabLst/>
                 <a:defRPr/>
               </a:pPr>
-              <a:t>5/28/2018</a:t>
+              <a:t>5/29/2018</a:t>
             </a:fld>
             <a:endParaRPr kumimoji="0" lang="en-US" sz="1200" b="0" i="0" u="none" strike="noStrike" kern="1200" cap="none" spc="0" normalizeH="0" baseline="0" noProof="0">
               <a:ln>
@@ -1841,7 +1846,7 @@
                 <a:tabLst/>
                 <a:defRPr/>
               </a:pPr>
-              <a:t>5/28/2018</a:t>
+              <a:t>5/29/2018</a:t>
             </a:fld>
             <a:endParaRPr kumimoji="0" lang="en-US" sz="1200" b="0" i="0" u="none" strike="noStrike" kern="1200" cap="none" spc="0" normalizeH="0" baseline="0" noProof="0">
               <a:ln>
@@ -2266,7 +2271,7 @@
                 <a:tabLst/>
                 <a:defRPr/>
               </a:pPr>
-              <a:t>5/28/2018</a:t>
+              <a:t>5/29/2018</a:t>
             </a:fld>
             <a:endParaRPr kumimoji="0" lang="en-US" sz="1200" b="0" i="0" u="none" strike="noStrike" kern="1200" cap="none" spc="0" normalizeH="0" baseline="0" noProof="0">
               <a:ln>
@@ -2838,7 +2843,7 @@
                 <a:tabLst/>
                 <a:defRPr/>
               </a:pPr>
-              <a:t>5/28/2018</a:t>
+              <a:t>5/29/2018</a:t>
             </a:fld>
             <a:endParaRPr kumimoji="0" lang="en-US" sz="1200" b="0" i="0" u="none" strike="noStrike" kern="1200" cap="none" spc="0" normalizeH="0" baseline="0" noProof="0">
               <a:ln>
@@ -3139,7 +3144,7 @@
                 <a:tabLst/>
                 <a:defRPr/>
               </a:pPr>
-              <a:t>5/28/2018</a:t>
+              <a:t>5/29/2018</a:t>
             </a:fld>
             <a:endParaRPr kumimoji="0" lang="en-US" sz="1200" b="0" i="0" u="none" strike="noStrike" kern="1200" cap="none" spc="0" normalizeH="0" baseline="0" noProof="0">
               <a:ln>
@@ -3412,7 +3417,7 @@
                 <a:tabLst/>
                 <a:defRPr/>
               </a:pPr>
-              <a:t>5/28/2018</a:t>
+              <a:t>5/29/2018</a:t>
             </a:fld>
             <a:endParaRPr kumimoji="0" lang="en-US" sz="1200" b="0" i="0" u="none" strike="noStrike" kern="1200" cap="none" spc="0" normalizeH="0" baseline="0" noProof="0">
               <a:ln>
@@ -3883,7 +3888,7 @@
                 <a:tabLst/>
                 <a:defRPr/>
               </a:pPr>
-              <a:t>5/28/2018</a:t>
+              <a:t>5/29/2018</a:t>
             </a:fld>
             <a:endParaRPr kumimoji="0" lang="en-US" sz="1200" b="0" i="0" u="none" strike="noStrike" kern="1200" cap="none" spc="0" normalizeH="0" baseline="0" noProof="0">
               <a:ln>
@@ -4331,7 +4336,7 @@
                 <a:tabLst/>
                 <a:defRPr/>
               </a:pPr>
-              <a:t>5/28/2018</a:t>
+              <a:t>5/29/2018</a:t>
             </a:fld>
             <a:endParaRPr kumimoji="0" lang="en-US" sz="1200" b="0" i="0" u="none" strike="noStrike" kern="1200" cap="none" spc="0" normalizeH="0" baseline="0" noProof="0">
               <a:ln>
@@ -4732,7 +4737,7 @@
                 <a:tabLst/>
                 <a:defRPr/>
               </a:pPr>
-              <a:t>5/28/2018</a:t>
+              <a:t>5/29/2018</a:t>
             </a:fld>
             <a:endParaRPr kumimoji="0" lang="en-US" sz="1200" b="0" i="0" u="none" strike="noStrike" kern="1200" cap="none" spc="0" normalizeH="0" baseline="0" noProof="0">
               <a:ln>
@@ -5600,7 +5605,12 @@
             <p:ph type="title"/>
           </p:nvPr>
         </p:nvSpPr>
-        <p:spPr/>
+        <p:spPr>
+          <a:xfrm>
+            <a:off x="838200" y="316357"/>
+            <a:ext cx="10515600" cy="1325563"/>
+          </a:xfrm>
+        </p:spPr>
         <p:txBody>
           <a:bodyPr>
             <a:normAutofit/>
@@ -5609,7 +5619,11 @@
           <a:p>
             <a:r>
               <a:rPr lang="en-US" b="1" dirty="0"/>
-              <a:t>Disable PHP File Execution in Certain WordPress Directories</a:t>
+              <a:t>Disable PHP File Execution in Certain WordPress </a:t>
+            </a:r>
+            <a:r>
+              <a:rPr lang="en-US" b="1" dirty="0" smtClean="0"/>
+              <a:t>Directories</a:t>
             </a:r>
             <a:endParaRPr lang="en-US" dirty="0"/>
           </a:p>
@@ -5625,7 +5639,12 @@
             <p:ph idx="1"/>
           </p:nvPr>
         </p:nvSpPr>
-        <p:spPr/>
+        <p:spPr>
+          <a:xfrm>
+            <a:off x="838200" y="1984121"/>
+            <a:ext cx="10515600" cy="4351338"/>
+          </a:xfrm>
+        </p:spPr>
         <p:txBody>
           <a:bodyPr/>
           <a:lstStyle/>
@@ -5661,7 +5680,11 @@
             </a:pPr>
             <a:r>
               <a:rPr lang="en-US" dirty="0"/>
-              <a:t>&lt;/Files&gt;</a:t>
+              <a:t>&lt;/Files</a:t>
+            </a:r>
+            <a:r>
+              <a:rPr lang="en-US" dirty="0" smtClean="0"/>
+              <a:t>&gt;</a:t>
             </a:r>
           </a:p>
           <a:p>
@@ -5838,6 +5861,13 @@
   <p:clrMapOvr>
     <a:masterClrMapping/>
   </p:clrMapOvr>
+  <p:timing>
+    <p:tnLst>
+      <p:par>
+        <p:cTn id="1" dur="indefinite" restart="never" nodeType="tmRoot"/>
+      </p:par>
+    </p:tnLst>
+  </p:timing>
 </p:sld>
 </file>
 
@@ -5920,10 +5950,69 @@
         </p:nvSpPr>
         <p:spPr/>
         <p:txBody>
-          <a:bodyPr/>
-          <a:lstStyle/>
-          <a:p>
+          <a:bodyPr>
+            <a:normAutofit/>
+          </a:bodyPr>
+          <a:lstStyle/>
+          <a:p>
+            <a:r>
+              <a:rPr lang="en-US" dirty="0" smtClean="0"/>
+              <a:t>Open </a:t>
+            </a:r>
+            <a:r>
+              <a:rPr lang="en-US" dirty="0" err="1" smtClean="0"/>
+              <a:t>wp-config.php</a:t>
+            </a:r>
+            <a:r>
+              <a:rPr lang="en-US" dirty="0" smtClean="0"/>
+              <a:t> file</a:t>
+            </a:r>
             <a:endParaRPr lang="en-US" dirty="0"/>
+          </a:p>
+          <a:p>
+            <a:pPr marL="0" indent="0">
+              <a:buNone/>
+            </a:pPr>
+            <a:r>
+              <a:rPr lang="en-US" dirty="0"/>
+              <a:t> </a:t>
+            </a:r>
+            <a:r>
+              <a:rPr lang="en-US" dirty="0" smtClean="0"/>
+              <a:t>  $</a:t>
+            </a:r>
+            <a:r>
+              <a:rPr lang="en-US" dirty="0" err="1" smtClean="0"/>
+              <a:t>table_prefix</a:t>
+            </a:r>
+            <a:r>
+              <a:rPr lang="en-US" dirty="0" smtClean="0"/>
+              <a:t> = ‘wp_a123456’;</a:t>
+            </a:r>
+          </a:p>
+          <a:p>
+            <a:pPr marL="0" indent="0">
+              <a:buNone/>
+            </a:pPr>
+            <a:endParaRPr lang="en-US" dirty="0" smtClean="0"/>
+          </a:p>
+          <a:p>
+            <a:pPr marL="0" indent="0">
+              <a:buNone/>
+            </a:pPr>
+            <a:endParaRPr lang="en-US" dirty="0"/>
+          </a:p>
+          <a:p>
+            <a:pPr marL="0" indent="0">
+              <a:buNone/>
+            </a:pPr>
+            <a:endParaRPr lang="en-US" dirty="0"/>
+          </a:p>
+          <a:p>
+            <a:pPr marL="0" indent="0">
+              <a:buNone/>
+            </a:pPr>
+            <a:endParaRPr lang="en-US" dirty="0" smtClean="0"/>
           </a:p>
         </p:txBody>
       </p:sp>
@@ -5931,6 +6020,623 @@
     <p:extLst>
       <p:ext uri="{BB962C8B-B14F-4D97-AF65-F5344CB8AC3E}">
         <p14:creationId xmlns:p14="http://schemas.microsoft.com/office/powerpoint/2010/main" val="3440967785"/>
+      </p:ext>
+    </p:extLst>
+  </p:cSld>
+  <p:clrMapOvr>
+    <a:masterClrMapping/>
+  </p:clrMapOvr>
+  <p:timing>
+    <p:tnLst>
+      <p:par>
+        <p:cTn id="1" dur="indefinite" restart="never" nodeType="tmRoot"/>
+      </p:par>
+    </p:tnLst>
+  </p:timing>
+</p:sld>
+</file>
+
+<file path=ppt/slides/slide16.xml><?xml version="1.0" encoding="utf-8"?>
+<p:sld xmlns:a="http://schemas.openxmlformats.org/drawingml/2006/main" xmlns:r="http://schemas.openxmlformats.org/officeDocument/2006/relationships" xmlns:p="http://schemas.openxmlformats.org/presentationml/2006/main">
+  <p:cSld>
+    <p:spTree>
+      <p:nvGrpSpPr>
+        <p:cNvPr id="1" name=""/>
+        <p:cNvGrpSpPr/>
+        <p:nvPr/>
+      </p:nvGrpSpPr>
+      <p:grpSpPr>
+        <a:xfrm>
+          <a:off x="0" y="0"/>
+          <a:ext cx="0" cy="0"/>
+          <a:chOff x="0" y="0"/>
+          <a:chExt cx="0" cy="0"/>
+        </a:xfrm>
+      </p:grpSpPr>
+      <p:sp>
+        <p:nvSpPr>
+          <p:cNvPr id="2" name="Title 1"/>
+          <p:cNvSpPr>
+            <a:spLocks noGrp="1"/>
+          </p:cNvSpPr>
+          <p:nvPr>
+            <p:ph type="title"/>
+          </p:nvPr>
+        </p:nvSpPr>
+        <p:spPr/>
+        <p:txBody>
+          <a:bodyPr/>
+          <a:lstStyle/>
+          <a:p>
+            <a:r>
+              <a:rPr lang="en-US" dirty="0"/>
+              <a:t>Go to Database and Rename </a:t>
+            </a:r>
+            <a:r>
+              <a:rPr lang="en-US" dirty="0" smtClean="0"/>
+              <a:t>Tables</a:t>
+            </a:r>
+            <a:endParaRPr lang="en-US" dirty="0"/>
+          </a:p>
+        </p:txBody>
+      </p:sp>
+      <p:sp>
+        <p:nvSpPr>
+          <p:cNvPr id="3" name="Content Placeholder 2"/>
+          <p:cNvSpPr>
+            <a:spLocks noGrp="1"/>
+          </p:cNvSpPr>
+          <p:nvPr>
+            <p:ph idx="1"/>
+          </p:nvPr>
+        </p:nvSpPr>
+        <p:spPr/>
+        <p:txBody>
+          <a:bodyPr>
+            <a:normAutofit fontScale="77500" lnSpcReduction="20000"/>
+          </a:bodyPr>
+          <a:lstStyle/>
+          <a:p>
+            <a:pPr marL="0" indent="0">
+              <a:buNone/>
+            </a:pPr>
+            <a:r>
+              <a:rPr lang="en-US" dirty="0" smtClean="0"/>
+              <a:t>RENAME </a:t>
+            </a:r>
+            <a:r>
+              <a:rPr lang="en-US" dirty="0"/>
+              <a:t>table `</a:t>
+            </a:r>
+            <a:r>
+              <a:rPr lang="en-US" dirty="0" err="1"/>
+              <a:t>wp_commentmeta</a:t>
+            </a:r>
+            <a:r>
+              <a:rPr lang="en-US" dirty="0"/>
+              <a:t>` TO `wp_a123456_commentmeta`;</a:t>
+            </a:r>
+          </a:p>
+          <a:p>
+            <a:pPr marL="0" indent="0">
+              <a:buNone/>
+            </a:pPr>
+            <a:r>
+              <a:rPr lang="en-US" dirty="0"/>
+              <a:t>RENAME table `</a:t>
+            </a:r>
+            <a:r>
+              <a:rPr lang="en-US" dirty="0" err="1"/>
+              <a:t>wp_comments</a:t>
+            </a:r>
+            <a:r>
+              <a:rPr lang="en-US" dirty="0"/>
+              <a:t>` TO `wp_a123456_comments`;</a:t>
+            </a:r>
+          </a:p>
+          <a:p>
+            <a:pPr marL="0" indent="0">
+              <a:buNone/>
+            </a:pPr>
+            <a:r>
+              <a:rPr lang="en-US" dirty="0"/>
+              <a:t>RENAME table `</a:t>
+            </a:r>
+            <a:r>
+              <a:rPr lang="en-US" dirty="0" err="1"/>
+              <a:t>wp_links</a:t>
+            </a:r>
+            <a:r>
+              <a:rPr lang="en-US" dirty="0"/>
+              <a:t>` TO `wp_a123456_links`;</a:t>
+            </a:r>
+          </a:p>
+          <a:p>
+            <a:pPr marL="0" indent="0">
+              <a:buNone/>
+            </a:pPr>
+            <a:r>
+              <a:rPr lang="en-US" dirty="0"/>
+              <a:t>RENAME table `</a:t>
+            </a:r>
+            <a:r>
+              <a:rPr lang="en-US" dirty="0" err="1"/>
+              <a:t>wp_options</a:t>
+            </a:r>
+            <a:r>
+              <a:rPr lang="en-US" dirty="0"/>
+              <a:t>` TO `wp_a123456_options`;</a:t>
+            </a:r>
+          </a:p>
+          <a:p>
+            <a:pPr marL="0" indent="0">
+              <a:buNone/>
+            </a:pPr>
+            <a:r>
+              <a:rPr lang="en-US" dirty="0"/>
+              <a:t>RENAME table `</a:t>
+            </a:r>
+            <a:r>
+              <a:rPr lang="en-US" dirty="0" err="1"/>
+              <a:t>wp_postmeta</a:t>
+            </a:r>
+            <a:r>
+              <a:rPr lang="en-US" dirty="0"/>
+              <a:t>` TO `wp_a123456_postmeta`;</a:t>
+            </a:r>
+          </a:p>
+          <a:p>
+            <a:pPr marL="0" indent="0">
+              <a:buNone/>
+            </a:pPr>
+            <a:r>
+              <a:rPr lang="en-US" dirty="0"/>
+              <a:t>RENAME table `</a:t>
+            </a:r>
+            <a:r>
+              <a:rPr lang="en-US" dirty="0" err="1"/>
+              <a:t>wp_posts</a:t>
+            </a:r>
+            <a:r>
+              <a:rPr lang="en-US" dirty="0"/>
+              <a:t>` TO `wp_a123456_posts`;</a:t>
+            </a:r>
+          </a:p>
+          <a:p>
+            <a:pPr marL="0" indent="0">
+              <a:buNone/>
+            </a:pPr>
+            <a:r>
+              <a:rPr lang="en-US" dirty="0"/>
+              <a:t>RENAME table `</a:t>
+            </a:r>
+            <a:r>
+              <a:rPr lang="en-US" dirty="0" err="1"/>
+              <a:t>wp_terms</a:t>
+            </a:r>
+            <a:r>
+              <a:rPr lang="en-US" dirty="0"/>
+              <a:t>` TO `wp_a123456_terms`;</a:t>
+            </a:r>
+          </a:p>
+          <a:p>
+            <a:pPr marL="0" indent="0">
+              <a:buNone/>
+            </a:pPr>
+            <a:r>
+              <a:rPr lang="en-US" dirty="0"/>
+              <a:t>RENAME table `</a:t>
+            </a:r>
+            <a:r>
+              <a:rPr lang="en-US" dirty="0" err="1"/>
+              <a:t>wp_termmeta</a:t>
+            </a:r>
+            <a:r>
+              <a:rPr lang="en-US" dirty="0"/>
+              <a:t>` TO `wp_a123456_termmeta`;</a:t>
+            </a:r>
+          </a:p>
+          <a:p>
+            <a:pPr marL="0" indent="0">
+              <a:buNone/>
+            </a:pPr>
+            <a:r>
+              <a:rPr lang="en-US" dirty="0"/>
+              <a:t>RENAME table `</a:t>
+            </a:r>
+            <a:r>
+              <a:rPr lang="en-US" dirty="0" err="1"/>
+              <a:t>wp_term_relationships</a:t>
+            </a:r>
+            <a:r>
+              <a:rPr lang="en-US" dirty="0"/>
+              <a:t>` TO `wp_a123456_term_relationships`;</a:t>
+            </a:r>
+          </a:p>
+          <a:p>
+            <a:pPr marL="0" indent="0">
+              <a:buNone/>
+            </a:pPr>
+            <a:r>
+              <a:rPr lang="en-US" dirty="0"/>
+              <a:t>RENAME table `</a:t>
+            </a:r>
+            <a:r>
+              <a:rPr lang="en-US" dirty="0" err="1"/>
+              <a:t>wp_term_taxonomy</a:t>
+            </a:r>
+            <a:r>
+              <a:rPr lang="en-US" dirty="0"/>
+              <a:t>` TO `wp_a123456_term_taxonomy`;</a:t>
+            </a:r>
+          </a:p>
+          <a:p>
+            <a:pPr marL="0" indent="0">
+              <a:buNone/>
+            </a:pPr>
+            <a:r>
+              <a:rPr lang="en-US" dirty="0"/>
+              <a:t>RENAME table `</a:t>
+            </a:r>
+            <a:r>
+              <a:rPr lang="en-US" dirty="0" err="1"/>
+              <a:t>wp_usermeta</a:t>
+            </a:r>
+            <a:r>
+              <a:rPr lang="en-US" dirty="0"/>
+              <a:t>` TO `wp_a123456_usermeta`;</a:t>
+            </a:r>
+          </a:p>
+          <a:p>
+            <a:pPr marL="0" indent="0">
+              <a:buNone/>
+            </a:pPr>
+            <a:r>
+              <a:rPr lang="en-US" dirty="0"/>
+              <a:t>RENAME table `</a:t>
+            </a:r>
+            <a:r>
+              <a:rPr lang="en-US" dirty="0" err="1"/>
+              <a:t>wp_users</a:t>
+            </a:r>
+            <a:r>
+              <a:rPr lang="en-US" dirty="0"/>
+              <a:t>` TO `wp_a123456_users`;</a:t>
+            </a:r>
+          </a:p>
+          <a:p>
+            <a:endParaRPr lang="en-US" dirty="0"/>
+          </a:p>
+        </p:txBody>
+      </p:sp>
+    </p:spTree>
+    <p:extLst>
+      <p:ext uri="{BB962C8B-B14F-4D97-AF65-F5344CB8AC3E}">
+        <p14:creationId xmlns:p14="http://schemas.microsoft.com/office/powerpoint/2010/main" val="2754815846"/>
+      </p:ext>
+    </p:extLst>
+  </p:cSld>
+  <p:clrMapOvr>
+    <a:masterClrMapping/>
+  </p:clrMapOvr>
+</p:sld>
+</file>
+
+<file path=ppt/slides/slide17.xml><?xml version="1.0" encoding="utf-8"?>
+<p:sld xmlns:a="http://schemas.openxmlformats.org/drawingml/2006/main" xmlns:r="http://schemas.openxmlformats.org/officeDocument/2006/relationships" xmlns:p="http://schemas.openxmlformats.org/presentationml/2006/main">
+  <p:cSld>
+    <p:spTree>
+      <p:nvGrpSpPr>
+        <p:cNvPr id="1" name=""/>
+        <p:cNvGrpSpPr/>
+        <p:nvPr/>
+      </p:nvGrpSpPr>
+      <p:grpSpPr>
+        <a:xfrm>
+          <a:off x="0" y="0"/>
+          <a:ext cx="0" cy="0"/>
+          <a:chOff x="0" y="0"/>
+          <a:chExt cx="0" cy="0"/>
+        </a:xfrm>
+      </p:grpSpPr>
+      <p:sp>
+        <p:nvSpPr>
+          <p:cNvPr id="2" name="Title 1"/>
+          <p:cNvSpPr>
+            <a:spLocks noGrp="1"/>
+          </p:cNvSpPr>
+          <p:nvPr>
+            <p:ph type="title"/>
+          </p:nvPr>
+        </p:nvSpPr>
+        <p:spPr/>
+        <p:txBody>
+          <a:bodyPr/>
+          <a:lstStyle/>
+          <a:p>
+            <a:r>
+              <a:rPr lang="en-US" dirty="0" smtClean="0"/>
+              <a:t>Change prefix in The options table</a:t>
+            </a:r>
+            <a:endParaRPr lang="en-US" dirty="0"/>
+          </a:p>
+        </p:txBody>
+      </p:sp>
+      <p:sp>
+        <p:nvSpPr>
+          <p:cNvPr id="3" name="Content Placeholder 2"/>
+          <p:cNvSpPr>
+            <a:spLocks noGrp="1"/>
+          </p:cNvSpPr>
+          <p:nvPr>
+            <p:ph idx="1"/>
+          </p:nvPr>
+        </p:nvSpPr>
+        <p:spPr/>
+        <p:txBody>
+          <a:bodyPr/>
+          <a:lstStyle/>
+          <a:p>
+            <a:pPr marL="0" indent="0">
+              <a:buNone/>
+            </a:pPr>
+            <a:r>
+              <a:rPr lang="en-US" dirty="0"/>
+              <a:t>SELECT * FROM `wp_a123456_options` WHERE `</a:t>
+            </a:r>
+            <a:r>
+              <a:rPr lang="en-US" dirty="0" err="1"/>
+              <a:t>option_name</a:t>
+            </a:r>
+            <a:r>
+              <a:rPr lang="en-US" dirty="0"/>
+              <a:t>` LIKE '%</a:t>
+            </a:r>
+            <a:r>
+              <a:rPr lang="en-US" dirty="0" err="1"/>
+              <a:t>wp</a:t>
+            </a:r>
+            <a:r>
+              <a:rPr lang="en-US" dirty="0" smtClean="0"/>
+              <a:t>_%‘</a:t>
+            </a:r>
+            <a:endParaRPr lang="en-US" dirty="0"/>
+          </a:p>
+        </p:txBody>
+      </p:sp>
+    </p:spTree>
+    <p:extLst>
+      <p:ext uri="{BB962C8B-B14F-4D97-AF65-F5344CB8AC3E}">
+        <p14:creationId xmlns:p14="http://schemas.microsoft.com/office/powerpoint/2010/main" val="747843024"/>
+      </p:ext>
+    </p:extLst>
+  </p:cSld>
+  <p:clrMapOvr>
+    <a:masterClrMapping/>
+  </p:clrMapOvr>
+</p:sld>
+</file>
+
+<file path=ppt/slides/slide18.xml><?xml version="1.0" encoding="utf-8"?>
+<p:sld xmlns:a="http://schemas.openxmlformats.org/drawingml/2006/main" xmlns:r="http://schemas.openxmlformats.org/officeDocument/2006/relationships" xmlns:p="http://schemas.openxmlformats.org/presentationml/2006/main">
+  <p:cSld>
+    <p:spTree>
+      <p:nvGrpSpPr>
+        <p:cNvPr id="1" name=""/>
+        <p:cNvGrpSpPr/>
+        <p:nvPr/>
+      </p:nvGrpSpPr>
+      <p:grpSpPr>
+        <a:xfrm>
+          <a:off x="0" y="0"/>
+          <a:ext cx="0" cy="0"/>
+          <a:chOff x="0" y="0"/>
+          <a:chExt cx="0" cy="0"/>
+        </a:xfrm>
+      </p:grpSpPr>
+      <p:sp>
+        <p:nvSpPr>
+          <p:cNvPr id="2" name="Title 1"/>
+          <p:cNvSpPr>
+            <a:spLocks noGrp="1"/>
+          </p:cNvSpPr>
+          <p:nvPr>
+            <p:ph type="title"/>
+          </p:nvPr>
+        </p:nvSpPr>
+        <p:spPr/>
+        <p:txBody>
+          <a:bodyPr/>
+          <a:lstStyle/>
+          <a:p>
+            <a:r>
+              <a:rPr lang="en-US" dirty="0" smtClean="0"/>
+              <a:t>Change prefix in The </a:t>
+            </a:r>
+            <a:r>
+              <a:rPr lang="en-US" dirty="0" err="1"/>
+              <a:t>UserMeta</a:t>
+            </a:r>
+            <a:r>
+              <a:rPr lang="en-US" dirty="0"/>
+              <a:t> </a:t>
+            </a:r>
+            <a:r>
+              <a:rPr lang="en-US" dirty="0" smtClean="0"/>
+              <a:t>Table</a:t>
+            </a:r>
+            <a:endParaRPr lang="en-US" dirty="0"/>
+          </a:p>
+        </p:txBody>
+      </p:sp>
+      <p:sp>
+        <p:nvSpPr>
+          <p:cNvPr id="3" name="Content Placeholder 2"/>
+          <p:cNvSpPr>
+            <a:spLocks noGrp="1"/>
+          </p:cNvSpPr>
+          <p:nvPr>
+            <p:ph idx="1"/>
+          </p:nvPr>
+        </p:nvSpPr>
+        <p:spPr/>
+        <p:txBody>
+          <a:bodyPr/>
+          <a:lstStyle/>
+          <a:p>
+            <a:pPr marL="0" indent="0">
+              <a:buNone/>
+            </a:pPr>
+            <a:r>
+              <a:rPr lang="en-US" dirty="0"/>
+              <a:t>SELECT * FROM `wp_a123456_usermeta` WHERE `</a:t>
+            </a:r>
+            <a:r>
+              <a:rPr lang="en-US" dirty="0" err="1"/>
+              <a:t>meta_key</a:t>
+            </a:r>
+            <a:r>
+              <a:rPr lang="en-US" dirty="0"/>
+              <a:t>` LIKE '%</a:t>
+            </a:r>
+            <a:r>
+              <a:rPr lang="en-US" dirty="0" err="1"/>
+              <a:t>wp</a:t>
+            </a:r>
+            <a:r>
+              <a:rPr lang="en-US" dirty="0" smtClean="0"/>
+              <a:t>_%‘</a:t>
+            </a:r>
+          </a:p>
+          <a:p>
+            <a:endParaRPr lang="en-US" dirty="0"/>
+          </a:p>
+          <a:p>
+            <a:pPr marL="0" indent="0">
+              <a:buNone/>
+            </a:pPr>
+            <a:r>
+              <a:rPr lang="en-US" dirty="0"/>
+              <a:t>Backup and Done</a:t>
+            </a:r>
+          </a:p>
+        </p:txBody>
+      </p:sp>
+    </p:spTree>
+    <p:extLst>
+      <p:ext uri="{BB962C8B-B14F-4D97-AF65-F5344CB8AC3E}">
+        <p14:creationId xmlns:p14="http://schemas.microsoft.com/office/powerpoint/2010/main" val="1640788916"/>
+      </p:ext>
+    </p:extLst>
+  </p:cSld>
+  <p:clrMapOvr>
+    <a:masterClrMapping/>
+  </p:clrMapOvr>
+</p:sld>
+</file>
+
+<file path=ppt/slides/slide19.xml><?xml version="1.0" encoding="utf-8"?>
+<p:sld xmlns:a="http://schemas.openxmlformats.org/drawingml/2006/main" xmlns:r="http://schemas.openxmlformats.org/officeDocument/2006/relationships" xmlns:p="http://schemas.openxmlformats.org/presentationml/2006/main">
+  <p:cSld>
+    <p:spTree>
+      <p:nvGrpSpPr>
+        <p:cNvPr id="1" name=""/>
+        <p:cNvGrpSpPr/>
+        <p:nvPr/>
+      </p:nvGrpSpPr>
+      <p:grpSpPr>
+        <a:xfrm>
+          <a:off x="0" y="0"/>
+          <a:ext cx="0" cy="0"/>
+          <a:chOff x="0" y="0"/>
+          <a:chExt cx="0" cy="0"/>
+        </a:xfrm>
+      </p:grpSpPr>
+      <p:sp>
+        <p:nvSpPr>
+          <p:cNvPr id="2" name="Title 1"/>
+          <p:cNvSpPr>
+            <a:spLocks noGrp="1"/>
+          </p:cNvSpPr>
+          <p:nvPr>
+            <p:ph type="title"/>
+          </p:nvPr>
+        </p:nvSpPr>
+        <p:spPr/>
+        <p:txBody>
+          <a:bodyPr/>
+          <a:lstStyle/>
+          <a:p>
+            <a:r>
+              <a:rPr lang="en-US" dirty="0" smtClean="0"/>
+              <a:t>Disable Directory Indexing and Browsing</a:t>
+            </a:r>
+            <a:endParaRPr lang="en-US" dirty="0"/>
+          </a:p>
+        </p:txBody>
+      </p:sp>
+      <p:sp>
+        <p:nvSpPr>
+          <p:cNvPr id="3" name="Content Placeholder 2"/>
+          <p:cNvSpPr>
+            <a:spLocks noGrp="1"/>
+          </p:cNvSpPr>
+          <p:nvPr>
+            <p:ph idx="1"/>
+          </p:nvPr>
+        </p:nvSpPr>
+        <p:spPr/>
+        <p:txBody>
+          <a:bodyPr/>
+          <a:lstStyle/>
+          <a:p>
+            <a:r>
+              <a:rPr lang="en-US" dirty="0"/>
+              <a:t>locate the .</a:t>
+            </a:r>
+            <a:r>
+              <a:rPr lang="en-US" dirty="0" err="1"/>
+              <a:t>htaccess</a:t>
+            </a:r>
+            <a:r>
+              <a:rPr lang="en-US" dirty="0"/>
+              <a:t> file in your website’s root </a:t>
+            </a:r>
+            <a:r>
+              <a:rPr lang="en-US" dirty="0" smtClean="0"/>
+              <a:t>directory</a:t>
+            </a:r>
+          </a:p>
+          <a:p>
+            <a:r>
+              <a:rPr lang="en-US" dirty="0" smtClean="0"/>
+              <a:t>Add the following line at the end of the .</a:t>
+            </a:r>
+            <a:r>
+              <a:rPr lang="en-US" dirty="0" err="1" smtClean="0"/>
+              <a:t>htaccess</a:t>
+            </a:r>
+            <a:r>
+              <a:rPr lang="en-US" dirty="0" smtClean="0"/>
+              <a:t> file:</a:t>
+            </a:r>
+          </a:p>
+          <a:p>
+            <a:pPr marL="0" indent="0">
+              <a:buNone/>
+            </a:pPr>
+            <a:r>
+              <a:rPr lang="en-US" dirty="0" smtClean="0"/>
+              <a:t>   Options -Indexes</a:t>
+            </a:r>
+            <a:endParaRPr lang="en-US" dirty="0"/>
+          </a:p>
+        </p:txBody>
+      </p:sp>
+    </p:spTree>
+    <p:extLst>
+      <p:ext uri="{BB962C8B-B14F-4D97-AF65-F5344CB8AC3E}">
+        <p14:creationId xmlns:p14="http://schemas.microsoft.com/office/powerpoint/2010/main" val="769773602"/>
       </p:ext>
     </p:extLst>
   </p:cSld>
@@ -6041,6 +6747,164 @@
     <p:extLst>
       <p:ext uri="{BB962C8B-B14F-4D97-AF65-F5344CB8AC3E}">
         <p14:creationId xmlns:p14="http://schemas.microsoft.com/office/powerpoint/2010/main" val="410046901"/>
+      </p:ext>
+    </p:extLst>
+  </p:cSld>
+  <p:clrMapOvr>
+    <a:masterClrMapping/>
+  </p:clrMapOvr>
+</p:sld>
+</file>
+
+<file path=ppt/slides/slide20.xml><?xml version="1.0" encoding="utf-8"?>
+<p:sld xmlns:a="http://schemas.openxmlformats.org/drawingml/2006/main" xmlns:r="http://schemas.openxmlformats.org/officeDocument/2006/relationships" xmlns:p="http://schemas.openxmlformats.org/presentationml/2006/main">
+  <p:cSld>
+    <p:spTree>
+      <p:nvGrpSpPr>
+        <p:cNvPr id="1" name=""/>
+        <p:cNvGrpSpPr/>
+        <p:nvPr/>
+      </p:nvGrpSpPr>
+      <p:grpSpPr>
+        <a:xfrm>
+          <a:off x="0" y="0"/>
+          <a:ext cx="0" cy="0"/>
+          <a:chOff x="0" y="0"/>
+          <a:chExt cx="0" cy="0"/>
+        </a:xfrm>
+      </p:grpSpPr>
+      <p:sp>
+        <p:nvSpPr>
+          <p:cNvPr id="2" name="Title 1"/>
+          <p:cNvSpPr>
+            <a:spLocks noGrp="1"/>
+          </p:cNvSpPr>
+          <p:nvPr>
+            <p:ph type="title"/>
+          </p:nvPr>
+        </p:nvSpPr>
+        <p:spPr/>
+        <p:txBody>
+          <a:bodyPr/>
+          <a:lstStyle/>
+          <a:p>
+            <a:r>
+              <a:rPr lang="en-US" dirty="0"/>
+              <a:t>Password Protect Your WordPress Admin (</a:t>
+            </a:r>
+            <a:r>
+              <a:rPr lang="en-US" dirty="0" err="1"/>
+              <a:t>wp</a:t>
+            </a:r>
+            <a:r>
+              <a:rPr lang="en-US" dirty="0"/>
+              <a:t>-admin) Directory</a:t>
+            </a:r>
+          </a:p>
+        </p:txBody>
+      </p:sp>
+      <p:sp>
+        <p:nvSpPr>
+          <p:cNvPr id="3" name="Content Placeholder 2"/>
+          <p:cNvSpPr>
+            <a:spLocks noGrp="1"/>
+          </p:cNvSpPr>
+          <p:nvPr>
+            <p:ph idx="1"/>
+          </p:nvPr>
+        </p:nvSpPr>
+        <p:spPr/>
+        <p:txBody>
+          <a:bodyPr/>
+          <a:lstStyle/>
+          <a:p>
+            <a:r>
+              <a:rPr lang="en-US" dirty="0"/>
+              <a:t>create a .</a:t>
+            </a:r>
+            <a:r>
+              <a:rPr lang="en-US" dirty="0" err="1" smtClean="0"/>
+              <a:t>htpasswd</a:t>
+            </a:r>
+            <a:r>
+              <a:rPr lang="en-US" dirty="0"/>
+              <a:t> file in home/user/.</a:t>
+            </a:r>
+            <a:r>
+              <a:rPr lang="en-US" dirty="0" err="1"/>
+              <a:t>htpasswds</a:t>
+            </a:r>
+            <a:r>
+              <a:rPr lang="en-US" dirty="0"/>
+              <a:t>/</a:t>
+            </a:r>
+            <a:r>
+              <a:rPr lang="en-US" dirty="0" err="1"/>
+              <a:t>public_html</a:t>
+            </a:r>
+            <a:r>
+              <a:rPr lang="en-US" dirty="0"/>
+              <a:t>/</a:t>
+            </a:r>
+            <a:r>
+              <a:rPr lang="en-US" dirty="0" err="1"/>
+              <a:t>wp</a:t>
+            </a:r>
+            <a:r>
+              <a:rPr lang="en-US" dirty="0"/>
+              <a:t>-admin/</a:t>
+            </a:r>
+            <a:r>
+              <a:rPr lang="en-US" dirty="0" err="1"/>
+              <a:t>passwd</a:t>
+            </a:r>
+            <a:r>
+              <a:rPr lang="en-US" dirty="0" smtClean="0"/>
+              <a:t>/</a:t>
+            </a:r>
+          </a:p>
+          <a:p>
+            <a:r>
+              <a:rPr lang="en-US" dirty="0" smtClean="0"/>
+              <a:t>You can Generate .</a:t>
+            </a:r>
+            <a:r>
+              <a:rPr lang="en-US" dirty="0" err="1" smtClean="0"/>
+              <a:t>htpasswd</a:t>
+            </a:r>
+            <a:r>
+              <a:rPr lang="en-US" dirty="0" smtClean="0"/>
+              <a:t> file using </a:t>
+            </a:r>
+            <a:r>
+              <a:rPr lang="en-US" dirty="0" smtClean="0">
+                <a:hlinkClick r:id="rId2" action="ppaction://hlinkfile"/>
+              </a:rPr>
+              <a:t>tools.dynamicdrive.com/password</a:t>
+            </a:r>
+            <a:endParaRPr lang="en-US" dirty="0" smtClean="0"/>
+          </a:p>
+          <a:p>
+            <a:r>
+              <a:rPr lang="en-US" dirty="0" smtClean="0"/>
+              <a:t>upload .</a:t>
+            </a:r>
+            <a:r>
+              <a:rPr lang="en-US" dirty="0" err="1" smtClean="0"/>
+              <a:t>htaccess</a:t>
+            </a:r>
+            <a:r>
+              <a:rPr lang="en-US" dirty="0" smtClean="0"/>
+              <a:t> file you wish to protect</a:t>
+            </a:r>
+            <a:endParaRPr lang="en-US" dirty="0"/>
+          </a:p>
+        </p:txBody>
+      </p:sp>
+    </p:spTree>
+    <p:extLst>
+      <p:ext uri="{BB962C8B-B14F-4D97-AF65-F5344CB8AC3E}">
+        <p14:creationId xmlns:p14="http://schemas.microsoft.com/office/powerpoint/2010/main" val="2538731853"/>
       </p:ext>
     </p:extLst>
   </p:cSld>

</xml_diff>